<commit_message>
small change. 1:1 instead 50:50
</commit_message>
<xml_diff>
--- a/Poster.pptx
+++ b/Poster.pptx
@@ -1178,6 +1178,11 @@
         </p:txBody>
       </p:sp>
     </p:spTree>
+    <p:extLst>
+      <p:ext uri="{BB962C8B-B14F-4D97-AF65-F5344CB8AC3E}">
+        <p14:creationId xmlns:p14="http://schemas.microsoft.com/office/powerpoint/2010/main" val="385251063"/>
+      </p:ext>
+    </p:extLst>
   </p:cSld>
   <p:clrMap bg1="lt1" tx1="dk1" bg2="dk2" tx2="lt2" accent1="accent1" accent2="accent2" accent3="accent3" accent4="accent4" accent5="accent5" accent6="accent6" hlink="hlink" folHlink="folHlink"/>
   <p:notesStyle>
@@ -1461,6 +1466,11 @@
         </p:txBody>
       </p:sp>
     </p:spTree>
+    <p:extLst>
+      <p:ext uri="{BB962C8B-B14F-4D97-AF65-F5344CB8AC3E}">
+        <p14:creationId xmlns:p14="http://schemas.microsoft.com/office/powerpoint/2010/main" val="251420136"/>
+      </p:ext>
+    </p:extLst>
   </p:cSld>
   <p:clrMapOvr>
     <a:masterClrMapping/>
@@ -15364,7 +15374,7 @@
                   <a:schemeClr val="dk1"/>
                 </a:solidFill>
               </a:rPr>
-              <a:t>For Brazilian name sets, we scraped Facebook pages of Brazilian groups, for example, “Clash of Clans Brazil” or “Brazilians for Animal Rights.” For non-Brazilian data, we scraped Facebook pages of colleges to ensure ethnic diversity in the name set of non-Brazilians. The final Distribution of Brazilian and non-Brazilian classes is </a:t>
+              <a:t>For Brazilian name sets, we scraped Facebook pages of Brazilian groups, for example, “Clash of Clans Brazil” or “Brazilians for Animal Rights.” For non-Brazilian data, we scraped Facebook pages of colleges to ensure ethnic diversity in the name set of non-Brazilians. The final Distribution of Brazilian and non-Brazilian classes </a:t>
             </a:r>
             <a:r>
               <a:rPr lang="en-US" sz="3700" dirty="0" smtClean="0">
@@ -15372,7 +15382,7 @@
                   <a:schemeClr val="dk1"/>
                 </a:solidFill>
               </a:rPr>
-              <a:t>50:50. </a:t>
+              <a:t>is 1:1. </a:t>
             </a:r>
             <a:r>
               <a:rPr lang="en-US" sz="3700" dirty="0">
@@ -15433,25 +15443,7 @@
                 </a:solidFill>
                 <a:sym typeface="Arial"/>
               </a:rPr>
-              <a:t>We </a:t>
-            </a:r>
-            <a:r>
-              <a:rPr lang="en-US" sz="3700" dirty="0" smtClean="0">
-                <a:solidFill>
-                  <a:schemeClr val="dk1"/>
-                </a:solidFill>
-                <a:sym typeface="Arial"/>
-              </a:rPr>
-              <a:t>used 80% of our data for training and 20% for testing and </a:t>
-            </a:r>
-            <a:r>
-              <a:rPr lang="en-US" sz="3700" dirty="0" smtClean="0">
-                <a:solidFill>
-                  <a:schemeClr val="dk1"/>
-                </a:solidFill>
-                <a:sym typeface="Arial"/>
-              </a:rPr>
-              <a:t>validation.</a:t>
+              <a:t>We used 80% of our data for training and 20% for testing and validation.</a:t>
             </a:r>
             <a:endParaRPr sz="3700" dirty="0">
               <a:solidFill>
@@ -15941,7 +15933,31 @@
                 <a:cs typeface="Arial"/>
                 <a:sym typeface="Arial"/>
               </a:rPr>
-              <a:t>A recurrent neural network is different from a vanilla one because it takes previous inputs into account, and each input has an associated timestamp. In our implementation, each letter of the name would be an input to the network with the position as the timestamp, e.g. the first letter of the name would have a timestamp of 1.</a:t>
+              <a:t>A recurrent neural network is different from a vanilla one because it </a:t>
+            </a:r>
+            <a:r>
+              <a:rPr lang="en-US" sz="3700" dirty="0" smtClean="0">
+                <a:solidFill>
+                  <a:schemeClr val="dk1"/>
+                </a:solidFill>
+                <a:latin typeface="Arial"/>
+                <a:ea typeface="Arial"/>
+                <a:cs typeface="Arial"/>
+                <a:sym typeface="Arial"/>
+              </a:rPr>
+              <a:t>learns from sequences, </a:t>
+            </a:r>
+            <a:r>
+              <a:rPr lang="en-US" sz="3700" dirty="0" smtClean="0">
+                <a:solidFill>
+                  <a:schemeClr val="dk1"/>
+                </a:solidFill>
+                <a:latin typeface="Arial"/>
+                <a:ea typeface="Arial"/>
+                <a:cs typeface="Arial"/>
+                <a:sym typeface="Arial"/>
+              </a:rPr>
+              <a:t>and each input has an associated timestamp. In our implementation, each letter of the name would be an input to the network with the position as the timestamp, e.g. the first letter of the name would have a timestamp of 1.</a:t>
             </a:r>
             <a:endParaRPr sz="3700" dirty="0">
               <a:solidFill>

</xml_diff>